<commit_message>
add something to ppt
</commit_message>
<xml_diff>
--- a/raytracing.pptx
+++ b/raytracing.pptx
@@ -3581,39 +3581,39 @@
           <a:lstStyle/>
           <a:p>
             <a:r>
-              <a:rPr lang="fr-CH" dirty="0"/>
+              <a:rPr lang="fr-CH" sz="2200" dirty="0"/>
               <a:t>- In </a:t>
             </a:r>
             <a:r>
-              <a:rPr lang="fr-CH" dirty="0" err="1"/>
+              <a:rPr lang="fr-CH" sz="2200" dirty="0" err="1"/>
               <a:t>our</a:t>
             </a:r>
             <a:r>
-              <a:rPr lang="fr-CH" dirty="0"/>
+              <a:rPr lang="fr-CH" sz="2200" dirty="0"/>
               <a:t> case the </a:t>
             </a:r>
             <a:r>
-              <a:rPr lang="fr-CH" dirty="0" err="1"/>
+              <a:rPr lang="fr-CH" sz="2200" dirty="0" err="1"/>
               <a:t>algorithm</a:t>
             </a:r>
             <a:r>
-              <a:rPr lang="fr-CH" dirty="0"/>
-              <a:t> </a:t>
-            </a:r>
-            <a:r>
-              <a:rPr lang="fr-CH" dirty="0" err="1"/>
+              <a:rPr lang="fr-CH" sz="2200" dirty="0"/>
+              <a:t> </a:t>
+            </a:r>
+            <a:r>
+              <a:rPr lang="fr-CH" sz="2200" dirty="0" err="1"/>
               <a:t>is</a:t>
             </a:r>
             <a:r>
-              <a:rPr lang="fr-CH" dirty="0"/>
-              <a:t> </a:t>
-            </a:r>
-            <a:r>
-              <a:rPr lang="fr-CH" dirty="0" err="1"/>
+              <a:rPr lang="fr-CH" sz="2200" dirty="0"/>
+              <a:t> </a:t>
+            </a:r>
+            <a:r>
+              <a:rPr lang="fr-CH" sz="2200" dirty="0" err="1"/>
               <a:t>painfully</a:t>
             </a:r>
             <a:r>
-              <a:rPr lang="fr-CH" dirty="0"/>
+              <a:rPr lang="fr-CH" sz="2200" dirty="0"/>
               <a:t> slow. </a:t>
             </a:r>
           </a:p>
@@ -3623,35 +3623,35 @@
               <a:buChar char="-"/>
             </a:pPr>
             <a:r>
-              <a:rPr lang="fr-CH" dirty="0" err="1"/>
+              <a:rPr lang="fr-CH" sz="2200" dirty="0" err="1"/>
               <a:t>We</a:t>
             </a:r>
             <a:r>
-              <a:rPr lang="fr-CH" dirty="0"/>
-              <a:t> </a:t>
-            </a:r>
-            <a:r>
-              <a:rPr lang="fr-CH" dirty="0" err="1"/>
+              <a:rPr lang="fr-CH" sz="2200" dirty="0"/>
+              <a:t> </a:t>
+            </a:r>
+            <a:r>
+              <a:rPr lang="fr-CH" sz="2200" dirty="0" err="1"/>
               <a:t>only</a:t>
             </a:r>
             <a:r>
-              <a:rPr lang="fr-CH" dirty="0"/>
+              <a:rPr lang="fr-CH" sz="2200" dirty="0"/>
               <a:t> use the </a:t>
             </a:r>
             <a:r>
-              <a:rPr lang="fr-CH" dirty="0" err="1"/>
+              <a:rPr lang="fr-CH" sz="2200" dirty="0" err="1"/>
               <a:t>reflection</a:t>
             </a:r>
             <a:r>
-              <a:rPr lang="fr-CH" dirty="0"/>
+              <a:rPr lang="fr-CH" sz="2200" dirty="0"/>
               <a:t> and not the </a:t>
             </a:r>
             <a:r>
-              <a:rPr lang="fr-CH" dirty="0" err="1"/>
+              <a:rPr lang="fr-CH" sz="2200" dirty="0" err="1"/>
               <a:t>refraction</a:t>
             </a:r>
             <a:r>
-              <a:rPr lang="fr-CH" dirty="0"/>
+              <a:rPr lang="fr-CH" sz="2200" dirty="0"/>
               <a:t>.</a:t>
             </a:r>
           </a:p>
@@ -3661,107 +3661,107 @@
               <a:buChar char="-"/>
             </a:pPr>
             <a:r>
-              <a:rPr lang="fr-CH" dirty="0" err="1"/>
+              <a:rPr lang="fr-CH" sz="2200" dirty="0" err="1"/>
               <a:t>Refraction</a:t>
             </a:r>
             <a:r>
-              <a:rPr lang="fr-CH" dirty="0"/>
-              <a:t> </a:t>
-            </a:r>
-            <a:r>
-              <a:rPr lang="fr-CH" dirty="0" err="1"/>
+              <a:rPr lang="fr-CH" sz="2200" dirty="0"/>
+              <a:t> </a:t>
+            </a:r>
+            <a:r>
+              <a:rPr lang="fr-CH" sz="2200" dirty="0" err="1"/>
               <a:t>wouldn’t</a:t>
             </a:r>
             <a:r>
-              <a:rPr lang="fr-CH" dirty="0"/>
-              <a:t> </a:t>
-            </a:r>
-            <a:r>
-              <a:rPr lang="fr-CH" dirty="0" err="1"/>
+              <a:rPr lang="fr-CH" sz="2200" dirty="0"/>
+              <a:t> </a:t>
+            </a:r>
+            <a:r>
+              <a:rPr lang="fr-CH" sz="2200" dirty="0" err="1"/>
               <a:t>necessary</a:t>
             </a:r>
             <a:r>
-              <a:rPr lang="fr-CH" dirty="0"/>
-              <a:t> </a:t>
-            </a:r>
-            <a:r>
-              <a:rPr lang="fr-CH" dirty="0" err="1"/>
+              <a:rPr lang="fr-CH" sz="2200" dirty="0"/>
+              <a:t> </a:t>
+            </a:r>
+            <a:r>
+              <a:rPr lang="fr-CH" sz="2200" dirty="0" err="1"/>
               <a:t>be</a:t>
             </a:r>
             <a:r>
-              <a:rPr lang="fr-CH" dirty="0"/>
-              <a:t> </a:t>
-            </a:r>
-            <a:r>
-              <a:rPr lang="fr-CH" dirty="0" err="1"/>
+              <a:rPr lang="fr-CH" sz="2200" dirty="0"/>
+              <a:t> </a:t>
+            </a:r>
+            <a:r>
+              <a:rPr lang="fr-CH" sz="2200" dirty="0" err="1"/>
               <a:t>much</a:t>
             </a:r>
             <a:r>
-              <a:rPr lang="fr-CH" dirty="0"/>
-              <a:t> </a:t>
-            </a:r>
-            <a:r>
-              <a:rPr lang="fr-CH" dirty="0" err="1"/>
+              <a:rPr lang="fr-CH" sz="2200" dirty="0"/>
+              <a:t> </a:t>
+            </a:r>
+            <a:r>
+              <a:rPr lang="fr-CH" sz="2200" dirty="0" err="1"/>
               <a:t>complicated</a:t>
             </a:r>
             <a:r>
-              <a:rPr lang="fr-CH" dirty="0"/>
+              <a:rPr lang="fr-CH" sz="2200" dirty="0"/>
               <a:t>. But </a:t>
             </a:r>
             <a:r>
-              <a:rPr lang="fr-CH" dirty="0" err="1"/>
+              <a:rPr lang="fr-CH" sz="2200" dirty="0" err="1"/>
               <a:t>we</a:t>
             </a:r>
             <a:r>
-              <a:rPr lang="fr-CH" dirty="0"/>
-              <a:t> </a:t>
-            </a:r>
-            <a:r>
-              <a:rPr lang="fr-CH" dirty="0" err="1"/>
+              <a:rPr lang="fr-CH" sz="2200" dirty="0"/>
+              <a:t> </a:t>
+            </a:r>
+            <a:r>
+              <a:rPr lang="fr-CH" sz="2200" dirty="0" err="1"/>
               <a:t>wanted</a:t>
             </a:r>
             <a:r>
-              <a:rPr lang="fr-CH" dirty="0"/>
+              <a:rPr lang="fr-CH" sz="2200" dirty="0"/>
               <a:t> to </a:t>
             </a:r>
             <a:r>
-              <a:rPr lang="fr-CH" dirty="0" err="1"/>
+              <a:rPr lang="fr-CH" sz="2200" dirty="0" err="1"/>
               <a:t>keep</a:t>
             </a:r>
             <a:r>
-              <a:rPr lang="fr-CH" dirty="0"/>
+              <a:rPr lang="fr-CH" sz="2200" dirty="0"/>
               <a:t> the code simple as </a:t>
             </a:r>
             <a:r>
-              <a:rPr lang="fr-CH" dirty="0" err="1"/>
+              <a:rPr lang="fr-CH" sz="2200" dirty="0" err="1"/>
               <a:t>it</a:t>
             </a:r>
             <a:r>
-              <a:rPr lang="fr-CH" dirty="0"/>
-              <a:t> </a:t>
-            </a:r>
-            <a:r>
-              <a:rPr lang="fr-CH" dirty="0" err="1"/>
+              <a:rPr lang="fr-CH" sz="2200" dirty="0"/>
+              <a:t> </a:t>
+            </a:r>
+            <a:r>
+              <a:rPr lang="fr-CH" sz="2200" dirty="0" err="1"/>
               <a:t>is</a:t>
             </a:r>
             <a:r>
-              <a:rPr lang="fr-CH" dirty="0"/>
+              <a:rPr lang="fr-CH" sz="2200" dirty="0"/>
               <a:t> a </a:t>
             </a:r>
             <a:r>
-              <a:rPr lang="fr-CH" dirty="0" err="1"/>
+              <a:rPr lang="fr-CH" sz="2200" dirty="0" err="1"/>
               <a:t>very</a:t>
             </a:r>
             <a:r>
-              <a:rPr lang="fr-CH" dirty="0"/>
+              <a:rPr lang="fr-CH" sz="2200" dirty="0"/>
               <a:t> basic </a:t>
             </a:r>
             <a:r>
-              <a:rPr lang="fr-CH" dirty="0" err="1"/>
+              <a:rPr lang="fr-CH" sz="2200" dirty="0" err="1"/>
               <a:t>raytracer</a:t>
             </a:r>
             <a:r>
-              <a:rPr lang="fr-CH" dirty="0"/>
+              <a:rPr lang="fr-CH" sz="2200" dirty="0"/>
               <a:t>. </a:t>
             </a:r>
           </a:p>
@@ -3889,7 +3889,7 @@
         <p:spPr/>
         <p:txBody>
           <a:bodyPr>
-            <a:normAutofit lnSpcReduction="10000"/>
+            <a:normAutofit fontScale="92500" lnSpcReduction="20000"/>
           </a:bodyPr>
           <a:lstStyle/>
           <a:p>
@@ -3953,6 +3953,18 @@
               </a:rPr>
               <a:t>http://alteredqualia.com/three/examples/raytracer_sandbox_reflection.html</a:t>
             </a:r>
+            <a:endParaRPr lang="fr-CH" dirty="0"/>
+          </a:p>
+          <a:p>
+            <a:r>
+              <a:rPr lang="fr-CH" dirty="0">
+                <a:hlinkClick r:id="rId9"/>
+              </a:rPr>
+              <a:t>http://images.cnitblog.com/blog/424169/201307/07013515-c8d36d1cc7b14c5681d644ed25065a19.png</a:t>
+            </a:r>
+            <a:endParaRPr lang="fr-CH" dirty="0"/>
+          </a:p>
+          <a:p>
             <a:endParaRPr lang="fr-CH" dirty="0"/>
           </a:p>
           <a:p>
@@ -5484,7 +5496,7 @@
             </a:r>
             <a:r>
               <a:rPr lang="fr-CH" dirty="0" err="1"/>
-              <a:t>ads_shading</a:t>
+              <a:t>compute_color</a:t>
             </a:r>
             <a:endParaRPr lang="fr-CH" dirty="0"/>
           </a:p>
@@ -5508,13 +5520,13 @@
         </p:nvSpPr>
         <p:spPr>
           <a:xfrm>
-            <a:off x="839788" y="2057400"/>
-            <a:ext cx="11038534" cy="2283781"/>
+            <a:off x="839788" y="1657350"/>
+            <a:ext cx="5532437" cy="2283781"/>
           </a:xfrm>
         </p:spPr>
         <p:txBody>
           <a:bodyPr>
-            <a:normAutofit/>
+            <a:noAutofit/>
           </a:bodyPr>
           <a:lstStyle/>
           <a:p>
@@ -5523,79 +5535,79 @@
               <a:buChar char="-"/>
             </a:pPr>
             <a:r>
-              <a:rPr lang="fr-CH" sz="2400" dirty="0"/>
+              <a:rPr lang="fr-CH" sz="2200" dirty="0"/>
               <a:t>Nothing </a:t>
             </a:r>
             <a:r>
-              <a:rPr lang="fr-CH" sz="2400" dirty="0" err="1"/>
+              <a:rPr lang="fr-CH" sz="2200" dirty="0" err="1"/>
               <a:t>different</a:t>
             </a:r>
             <a:r>
-              <a:rPr lang="fr-CH" sz="2400" dirty="0"/>
-              <a:t> </a:t>
-            </a:r>
-            <a:r>
-              <a:rPr lang="fr-CH" sz="2400" dirty="0" err="1"/>
+              <a:rPr lang="fr-CH" sz="2200" dirty="0"/>
+              <a:t> </a:t>
+            </a:r>
+            <a:r>
+              <a:rPr lang="fr-CH" sz="2200" dirty="0" err="1"/>
               <a:t>than</a:t>
             </a:r>
             <a:r>
-              <a:rPr lang="fr-CH" sz="2400" dirty="0"/>
-              <a:t> </a:t>
-            </a:r>
-            <a:r>
-              <a:rPr lang="fr-CH" sz="2400" dirty="0" err="1"/>
+              <a:rPr lang="fr-CH" sz="2200" dirty="0"/>
+              <a:t> </a:t>
+            </a:r>
+            <a:r>
+              <a:rPr lang="fr-CH" sz="2200" dirty="0" err="1"/>
               <a:t>what</a:t>
             </a:r>
             <a:r>
-              <a:rPr lang="fr-CH" sz="2400" dirty="0"/>
-              <a:t> </a:t>
-            </a:r>
-            <a:r>
-              <a:rPr lang="fr-CH" sz="2400" dirty="0" err="1"/>
+              <a:rPr lang="fr-CH" sz="2200" dirty="0"/>
+              <a:t> </a:t>
+            </a:r>
+            <a:r>
+              <a:rPr lang="fr-CH" sz="2200" dirty="0" err="1"/>
               <a:t>we</a:t>
             </a:r>
             <a:r>
-              <a:rPr lang="fr-CH" sz="2400" dirty="0"/>
-              <a:t> </a:t>
-            </a:r>
-            <a:r>
-              <a:rPr lang="fr-CH" sz="2400" dirty="0" err="1"/>
+              <a:rPr lang="fr-CH" sz="2200" dirty="0"/>
+              <a:t> </a:t>
+            </a:r>
+            <a:r>
+              <a:rPr lang="fr-CH" sz="2200" dirty="0" err="1"/>
               <a:t>used</a:t>
             </a:r>
             <a:r>
-              <a:rPr lang="fr-CH" sz="2400" dirty="0"/>
+              <a:rPr lang="fr-CH" sz="2200" dirty="0"/>
               <a:t> to do in the </a:t>
             </a:r>
             <a:r>
-              <a:rPr lang="fr-CH" sz="2400" dirty="0" err="1"/>
+              <a:rPr lang="fr-CH" sz="2200" dirty="0" err="1"/>
               <a:t>shader</a:t>
             </a:r>
             <a:r>
-              <a:rPr lang="fr-CH" sz="2400" dirty="0"/>
+              <a:rPr lang="fr-CH" sz="2200" dirty="0"/>
               <a:t> code in </a:t>
             </a:r>
             <a:r>
-              <a:rPr lang="fr-CH" sz="2400" dirty="0" err="1"/>
+              <a:rPr lang="fr-CH" sz="2200" dirty="0" err="1"/>
               <a:t>many</a:t>
             </a:r>
             <a:r>
-              <a:rPr lang="fr-CH" sz="2400" dirty="0"/>
+              <a:rPr lang="fr-CH" sz="2200" dirty="0"/>
               <a:t> of </a:t>
             </a:r>
             <a:r>
-              <a:rPr lang="fr-CH" sz="2400" dirty="0" err="1"/>
+              <a:rPr lang="fr-CH" sz="2200" dirty="0" err="1"/>
               <a:t>our</a:t>
             </a:r>
             <a:r>
-              <a:rPr lang="fr-CH" sz="2400" dirty="0"/>
-              <a:t> </a:t>
-            </a:r>
-            <a:r>
-              <a:rPr lang="fr-CH" sz="2400" dirty="0" err="1"/>
+              <a:rPr lang="fr-CH" sz="2200" dirty="0"/>
+              <a:t> </a:t>
+            </a:r>
+            <a:r>
+              <a:rPr lang="fr-CH" sz="2200" dirty="0" err="1"/>
               <a:t>examples</a:t>
             </a:r>
             <a:r>
-              <a:rPr lang="fr-CH" sz="2400" dirty="0"/>
+              <a:rPr lang="fr-CH" sz="2200" dirty="0"/>
               <a:t>. </a:t>
             </a:r>
           </a:p>
@@ -5605,75 +5617,67 @@
               <a:buChar char="-"/>
             </a:pPr>
             <a:r>
-              <a:rPr lang="fr-CH" sz="2400" dirty="0" err="1"/>
+              <a:rPr lang="fr-CH" sz="2200" dirty="0" err="1"/>
               <a:t>We</a:t>
             </a:r>
             <a:r>
-              <a:rPr lang="fr-CH" sz="2400" dirty="0"/>
+              <a:rPr lang="fr-CH" sz="2200" dirty="0"/>
               <a:t> use the </a:t>
             </a:r>
             <a:r>
-              <a:rPr lang="fr-CH" sz="2400" dirty="0" err="1"/>
+              <a:rPr lang="fr-CH" sz="2200" dirty="0" err="1"/>
               <a:t>Blinn-Phong</a:t>
             </a:r>
             <a:r>
-              <a:rPr lang="fr-CH" sz="2400" dirty="0"/>
+              <a:rPr lang="fr-CH" sz="2200" dirty="0"/>
               <a:t>. </a:t>
             </a:r>
             <a:r>
-              <a:rPr lang="fr-CH" sz="2400" dirty="0" err="1"/>
+              <a:rPr lang="fr-CH" sz="2200" dirty="0" err="1"/>
               <a:t>Because</a:t>
             </a:r>
             <a:r>
-              <a:rPr lang="fr-CH" sz="2400" dirty="0"/>
-              <a:t> </a:t>
-            </a:r>
-            <a:r>
-              <a:rPr lang="fr-CH" sz="2400" dirty="0" err="1"/>
+              <a:rPr lang="fr-CH" sz="2200" dirty="0"/>
+              <a:t> </a:t>
+            </a:r>
+            <a:r>
+              <a:rPr lang="fr-CH" sz="2200" dirty="0" err="1"/>
               <a:t>computing</a:t>
             </a:r>
             <a:r>
-              <a:rPr lang="fr-CH" sz="2400" dirty="0"/>
+              <a:rPr lang="fr-CH" sz="2200" dirty="0"/>
               <a:t> the </a:t>
             </a:r>
             <a:r>
-              <a:rPr lang="fr-CH" sz="2400" dirty="0" err="1"/>
+              <a:rPr lang="fr-CH" sz="2200" dirty="0" err="1"/>
               <a:t>half-way</a:t>
             </a:r>
             <a:r>
-              <a:rPr lang="fr-CH" sz="2400" dirty="0"/>
-              <a:t> </a:t>
-            </a:r>
-            <a:r>
-              <a:rPr lang="fr-CH" sz="2400" dirty="0" err="1"/>
+              <a:rPr lang="fr-CH" sz="2200" dirty="0"/>
+              <a:t> </a:t>
+            </a:r>
+            <a:r>
+              <a:rPr lang="fr-CH" sz="2200" dirty="0" err="1"/>
               <a:t>vector</a:t>
             </a:r>
             <a:r>
-              <a:rPr lang="fr-CH" sz="2400" dirty="0"/>
-              <a:t> </a:t>
-            </a:r>
-            <a:r>
-              <a:rPr lang="fr-CH" sz="2400" dirty="0" err="1"/>
-              <a:t>is</a:t>
-            </a:r>
-            <a:r>
-              <a:rPr lang="fr-CH" sz="2400" dirty="0"/>
-              <a:t> </a:t>
-            </a:r>
-            <a:r>
-              <a:rPr lang="fr-CH" sz="2400" dirty="0" err="1"/>
-              <a:t>much</a:t>
-            </a:r>
-            <a:r>
-              <a:rPr lang="fr-CH" sz="2400" dirty="0"/>
-              <a:t> </a:t>
-            </a:r>
-            <a:r>
-              <a:rPr lang="fr-CH" sz="2400" dirty="0" err="1"/>
+              <a:rPr lang="fr-CH" sz="2200" dirty="0"/>
+              <a:t> </a:t>
+            </a:r>
+            <a:r>
+              <a:rPr lang="fr-CH" sz="2200" dirty="0" err="1"/>
+              <a:t>was</a:t>
+            </a:r>
+            <a:r>
+              <a:rPr lang="fr-CH" sz="2200" dirty="0"/>
+              <a:t> </a:t>
+            </a:r>
+            <a:r>
+              <a:rPr lang="fr-CH" sz="2200" dirty="0" err="1"/>
               <a:t>easier</a:t>
             </a:r>
             <a:r>
-              <a:rPr lang="fr-CH" sz="2400" dirty="0"/>
+              <a:rPr lang="fr-CH" sz="2200" dirty="0"/>
               <a:t>. </a:t>
             </a:r>
           </a:p>
@@ -5683,63 +5687,63 @@
               <a:buChar char="-"/>
             </a:pPr>
             <a:r>
-              <a:rPr lang="fr-CH" sz="2400" dirty="0"/>
+              <a:rPr lang="fr-CH" sz="2200" dirty="0"/>
               <a:t>Looks </a:t>
             </a:r>
             <a:r>
-              <a:rPr lang="fr-CH" sz="2400" dirty="0" err="1"/>
+              <a:rPr lang="fr-CH" sz="2200" dirty="0" err="1"/>
               <a:t>easy</a:t>
             </a:r>
             <a:r>
-              <a:rPr lang="fr-CH" sz="2400" dirty="0"/>
+              <a:rPr lang="fr-CH" sz="2200" dirty="0"/>
               <a:t> in </a:t>
             </a:r>
             <a:r>
-              <a:rPr lang="fr-CH" sz="2400" dirty="0" err="1"/>
+              <a:rPr lang="fr-CH" sz="2200" dirty="0" err="1"/>
               <a:t>theory</a:t>
             </a:r>
             <a:r>
-              <a:rPr lang="fr-CH" sz="2400" dirty="0"/>
+              <a:rPr lang="fr-CH" sz="2200" dirty="0"/>
               <a:t>. In practice, </a:t>
             </a:r>
             <a:r>
-              <a:rPr lang="fr-CH" sz="2400" dirty="0" err="1"/>
+              <a:rPr lang="fr-CH" sz="2200" dirty="0" err="1"/>
               <a:t>much</a:t>
             </a:r>
             <a:r>
-              <a:rPr lang="fr-CH" sz="2400" dirty="0"/>
+              <a:rPr lang="fr-CH" sz="2200" dirty="0"/>
               <a:t> harder </a:t>
             </a:r>
             <a:r>
-              <a:rPr lang="fr-CH" sz="2400" dirty="0" err="1"/>
+              <a:rPr lang="fr-CH" sz="2200" dirty="0" err="1"/>
               <a:t>than</a:t>
             </a:r>
             <a:r>
-              <a:rPr lang="fr-CH" sz="2400" dirty="0"/>
-              <a:t> </a:t>
-            </a:r>
-            <a:r>
-              <a:rPr lang="fr-CH" sz="2400" dirty="0" err="1"/>
+              <a:rPr lang="fr-CH" sz="2200" dirty="0"/>
+              <a:t> </a:t>
+            </a:r>
+            <a:r>
+              <a:rPr lang="fr-CH" sz="2200" dirty="0" err="1"/>
               <a:t>what</a:t>
             </a:r>
             <a:r>
-              <a:rPr lang="fr-CH" sz="2400" dirty="0"/>
-              <a:t> </a:t>
-            </a:r>
-            <a:r>
-              <a:rPr lang="fr-CH" sz="2400" dirty="0" err="1"/>
+              <a:rPr lang="fr-CH" sz="2200" dirty="0"/>
+              <a:t> </a:t>
+            </a:r>
+            <a:r>
+              <a:rPr lang="fr-CH" sz="2200" dirty="0" err="1"/>
               <a:t>we</a:t>
             </a:r>
             <a:r>
-              <a:rPr lang="fr-CH" sz="2400" dirty="0"/>
-              <a:t> </a:t>
-            </a:r>
-            <a:r>
-              <a:rPr lang="fr-CH" sz="2400" dirty="0" err="1"/>
+              <a:rPr lang="fr-CH" sz="2200" dirty="0"/>
+              <a:t> </a:t>
+            </a:r>
+            <a:r>
+              <a:rPr lang="fr-CH" sz="2200" dirty="0" err="1"/>
               <a:t>thought</a:t>
             </a:r>
             <a:r>
-              <a:rPr lang="fr-CH" sz="2400" dirty="0"/>
+              <a:rPr lang="fr-CH" sz="2200" dirty="0"/>
               <a:t>. </a:t>
             </a:r>
           </a:p>
@@ -5749,36 +5753,150 @@
               <a:buChar char="-"/>
             </a:pPr>
             <a:r>
-              <a:rPr lang="fr-CH" sz="2400" dirty="0"/>
+              <a:rPr lang="fr-CH" sz="2200" dirty="0"/>
               <a:t>The </a:t>
             </a:r>
             <a:r>
-              <a:rPr lang="fr-CH" sz="2400" dirty="0" err="1"/>
+              <a:rPr lang="fr-CH" sz="2200" dirty="0" err="1"/>
               <a:t>results</a:t>
             </a:r>
             <a:r>
-              <a:rPr lang="fr-CH" sz="2400" dirty="0"/>
-              <a:t> </a:t>
-            </a:r>
-            <a:r>
-              <a:rPr lang="fr-CH" sz="2400" dirty="0" err="1"/>
+              <a:rPr lang="fr-CH" sz="2200" dirty="0"/>
+              <a:t> </a:t>
+            </a:r>
+            <a:r>
+              <a:rPr lang="fr-CH" sz="2200" dirty="0" err="1"/>
               <a:t>vary</a:t>
             </a:r>
             <a:r>
-              <a:rPr lang="fr-CH" sz="2400" dirty="0"/>
+              <a:rPr lang="fr-CH" sz="2200" dirty="0"/>
               <a:t> in </a:t>
             </a:r>
             <a:r>
-              <a:rPr lang="fr-CH" sz="2400" dirty="0" err="1"/>
+              <a:rPr lang="fr-CH" sz="2200" dirty="0" err="1"/>
               <a:t>effectiveness</a:t>
             </a:r>
             <a:r>
-              <a:rPr lang="fr-CH" sz="2400" dirty="0"/>
+              <a:rPr lang="fr-CH" sz="2200" dirty="0"/>
               <a:t>…</a:t>
             </a:r>
           </a:p>
-        </p:txBody>
-      </p:sp>
+          <a:p>
+            <a:pPr marL="285750" indent="-285750">
+              <a:buFontTx/>
+              <a:buChar char="-"/>
+            </a:pPr>
+            <a:endParaRPr lang="fr-CH" sz="2200" dirty="0"/>
+          </a:p>
+          <a:p>
+            <a:pPr marL="285750" indent="-285750">
+              <a:buFontTx/>
+              <a:buChar char="-"/>
+            </a:pPr>
+            <a:r>
+              <a:rPr lang="fr-CH" sz="2200" dirty="0" err="1"/>
+              <a:t>Reminder</a:t>
+            </a:r>
+            <a:r>
+              <a:rPr lang="fr-CH" sz="2200" dirty="0"/>
+              <a:t> </a:t>
+            </a:r>
+            <a:r>
+              <a:rPr lang="fr-CH" sz="2200" dirty="0" err="1"/>
+              <a:t>Blinn-Phong</a:t>
+            </a:r>
+            <a:r>
+              <a:rPr lang="fr-CH" sz="2200" dirty="0"/>
+              <a:t> : </a:t>
+            </a:r>
+          </a:p>
+          <a:p>
+            <a:pPr marL="285750" indent="-285750">
+              <a:buFontTx/>
+              <a:buChar char="-"/>
+            </a:pPr>
+            <a:r>
+              <a:rPr lang="fr-CH" sz="2200" dirty="0" err="1"/>
+              <a:t>Compute</a:t>
+            </a:r>
+            <a:r>
+              <a:rPr lang="fr-CH" sz="2200" dirty="0"/>
+              <a:t> ADS like for </a:t>
+            </a:r>
+            <a:r>
+              <a:rPr lang="fr-CH" sz="2200" dirty="0" err="1"/>
+              <a:t>Phong</a:t>
+            </a:r>
+            <a:r>
+              <a:rPr lang="fr-CH" sz="2200" dirty="0"/>
+              <a:t> but…</a:t>
+            </a:r>
+          </a:p>
+          <a:p>
+            <a:pPr marL="285750" indent="-285750">
+              <a:buFontTx/>
+              <a:buChar char="-"/>
+            </a:pPr>
+            <a:r>
+              <a:rPr lang="fr-CH" sz="2200" dirty="0" err="1"/>
+              <a:t>Specular</a:t>
+            </a:r>
+            <a:r>
+              <a:rPr lang="fr-CH" sz="2200" dirty="0"/>
+              <a:t> </a:t>
+            </a:r>
+            <a:r>
+              <a:rPr lang="fr-CH" sz="2200" dirty="0" err="1"/>
+              <a:t>is</a:t>
+            </a:r>
+            <a:r>
+              <a:rPr lang="fr-CH" sz="2200" dirty="0"/>
+              <a:t> </a:t>
+            </a:r>
+            <a:r>
+              <a:rPr lang="fr-CH" sz="2200" dirty="0" err="1"/>
+              <a:t>different</a:t>
+            </a:r>
+            <a:endParaRPr lang="fr-CH" sz="2200" dirty="0"/>
+          </a:p>
+        </p:txBody>
+      </p:sp>
+      <p:pic>
+        <p:nvPicPr>
+          <p:cNvPr id="5" name="Image 4">
+            <a:extLst>
+              <a:ext uri="{FF2B5EF4-FFF2-40B4-BE49-F238E27FC236}">
+                <a16:creationId xmlns:a16="http://schemas.microsoft.com/office/drawing/2014/main" id="{B340AC92-D8EC-481E-BED2-32540C7F07D6}"/>
+              </a:ext>
+            </a:extLst>
+          </p:cNvPr>
+          <p:cNvPicPr>
+            <a:picLocks noChangeAspect="1"/>
+          </p:cNvPicPr>
+          <p:nvPr/>
+        </p:nvPicPr>
+        <p:blipFill>
+          <a:blip r:embed="rId2">
+            <a:extLst>
+              <a:ext uri="{28A0092B-C50C-407E-A947-70E740481C1C}">
+                <a14:useLocalDpi xmlns:a14="http://schemas.microsoft.com/office/drawing/2010/main" val="0"/>
+              </a:ext>
+            </a:extLst>
+          </a:blip>
+          <a:stretch>
+            <a:fillRect/>
+          </a:stretch>
+        </p:blipFill>
+        <p:spPr>
+          <a:xfrm>
+            <a:off x="7895262" y="3429000"/>
+            <a:ext cx="3983060" cy="3106406"/>
+          </a:xfrm>
+          <a:prstGeom prst="rect">
+            <a:avLst/>
+          </a:prstGeom>
+        </p:spPr>
+      </p:pic>
     </p:spTree>
     <p:extLst>
       <p:ext uri="{BB962C8B-B14F-4D97-AF65-F5344CB8AC3E}">

</xml_diff>